<commit_message>
Progress on SOA for CRm
</commit_message>
<xml_diff>
--- a/src/DimensionalData/DimensionalData.pptx
+++ b/src/DimensionalData/DimensionalData.pptx
@@ -105,6 +105,11 @@
       </a:defRPr>
     </a:lvl9pPr>
   </p:defaultTextStyle>
+  <p:extLst>
+    <p:ext uri="{EFAFB233-063F-42B5-8137-9DF3F51BA10A}">
+      <p15:sldGuideLst xmlns:p15="http://schemas.microsoft.com/office/powerpoint/2012/main"/>
+    </p:ext>
+  </p:extLst>
 </p:presentation>
 </file>
 
@@ -239,7 +244,7 @@
           <a:p>
             <a:fld id="{F44F08F0-F02E-4082-8FCC-7AAE964D9F09}" type="datetimeFigureOut">
               <a:rPr lang="en-US" smtClean="0"/>
-              <a:t>5/13/2017</a:t>
+              <a:t>5/14/2017</a:t>
             </a:fld>
             <a:endParaRPr lang="en-US"/>
           </a:p>
@@ -409,7 +414,7 @@
           <a:p>
             <a:fld id="{F44F08F0-F02E-4082-8FCC-7AAE964D9F09}" type="datetimeFigureOut">
               <a:rPr lang="en-US" smtClean="0"/>
-              <a:t>5/13/2017</a:t>
+              <a:t>5/14/2017</a:t>
             </a:fld>
             <a:endParaRPr lang="en-US"/>
           </a:p>
@@ -589,7 +594,7 @@
           <a:p>
             <a:fld id="{F44F08F0-F02E-4082-8FCC-7AAE964D9F09}" type="datetimeFigureOut">
               <a:rPr lang="en-US" smtClean="0"/>
-              <a:t>5/13/2017</a:t>
+              <a:t>5/14/2017</a:t>
             </a:fld>
             <a:endParaRPr lang="en-US"/>
           </a:p>
@@ -759,7 +764,7 @@
           <a:p>
             <a:fld id="{F44F08F0-F02E-4082-8FCC-7AAE964D9F09}" type="datetimeFigureOut">
               <a:rPr lang="en-US" smtClean="0"/>
-              <a:t>5/13/2017</a:t>
+              <a:t>5/14/2017</a:t>
             </a:fld>
             <a:endParaRPr lang="en-US"/>
           </a:p>
@@ -1005,7 +1010,7 @@
           <a:p>
             <a:fld id="{F44F08F0-F02E-4082-8FCC-7AAE964D9F09}" type="datetimeFigureOut">
               <a:rPr lang="en-US" smtClean="0"/>
-              <a:t>5/13/2017</a:t>
+              <a:t>5/14/2017</a:t>
             </a:fld>
             <a:endParaRPr lang="en-US"/>
           </a:p>
@@ -1237,7 +1242,7 @@
           <a:p>
             <a:fld id="{F44F08F0-F02E-4082-8FCC-7AAE964D9F09}" type="datetimeFigureOut">
               <a:rPr lang="en-US" smtClean="0"/>
-              <a:t>5/13/2017</a:t>
+              <a:t>5/14/2017</a:t>
             </a:fld>
             <a:endParaRPr lang="en-US"/>
           </a:p>
@@ -1604,7 +1609,7 @@
           <a:p>
             <a:fld id="{F44F08F0-F02E-4082-8FCC-7AAE964D9F09}" type="datetimeFigureOut">
               <a:rPr lang="en-US" smtClean="0"/>
-              <a:t>5/13/2017</a:t>
+              <a:t>5/14/2017</a:t>
             </a:fld>
             <a:endParaRPr lang="en-US"/>
           </a:p>
@@ -1722,7 +1727,7 @@
           <a:p>
             <a:fld id="{F44F08F0-F02E-4082-8FCC-7AAE964D9F09}" type="datetimeFigureOut">
               <a:rPr lang="en-US" smtClean="0"/>
-              <a:t>5/13/2017</a:t>
+              <a:t>5/14/2017</a:t>
             </a:fld>
             <a:endParaRPr lang="en-US"/>
           </a:p>
@@ -1817,7 +1822,7 @@
           <a:p>
             <a:fld id="{F44F08F0-F02E-4082-8FCC-7AAE964D9F09}" type="datetimeFigureOut">
               <a:rPr lang="en-US" smtClean="0"/>
-              <a:t>5/13/2017</a:t>
+              <a:t>5/14/2017</a:t>
             </a:fld>
             <a:endParaRPr lang="en-US"/>
           </a:p>
@@ -2094,7 +2099,7 @@
           <a:p>
             <a:fld id="{F44F08F0-F02E-4082-8FCC-7AAE964D9F09}" type="datetimeFigureOut">
               <a:rPr lang="en-US" smtClean="0"/>
-              <a:t>5/13/2017</a:t>
+              <a:t>5/14/2017</a:t>
             </a:fld>
             <a:endParaRPr lang="en-US"/>
           </a:p>
@@ -2347,7 +2352,7 @@
           <a:p>
             <a:fld id="{F44F08F0-F02E-4082-8FCC-7AAE964D9F09}" type="datetimeFigureOut">
               <a:rPr lang="en-US" smtClean="0"/>
-              <a:t>5/13/2017</a:t>
+              <a:t>5/14/2017</a:t>
             </a:fld>
             <a:endParaRPr lang="en-US"/>
           </a:p>
@@ -2560,7 +2565,7 @@
           <a:p>
             <a:fld id="{F44F08F0-F02E-4082-8FCC-7AAE964D9F09}" type="datetimeFigureOut">
               <a:rPr lang="en-US" smtClean="0"/>
-              <a:t>5/13/2017</a:t>
+              <a:t>5/14/2017</a:t>
             </a:fld>
             <a:endParaRPr lang="en-US"/>
           </a:p>
@@ -3604,13 +3609,136 @@
       </p:grpSpPr>
       <p:sp>
         <p:nvSpPr>
+          <p:cNvPr id="45" name="Rectangle 44"/>
+          <p:cNvSpPr/>
+          <p:nvPr/>
+        </p:nvSpPr>
+        <p:spPr>
+          <a:xfrm>
+            <a:off x="2347546" y="2973994"/>
+            <a:ext cx="4703884" cy="888018"/>
+          </a:xfrm>
+          <a:prstGeom prst="rect">
+            <a:avLst/>
+          </a:prstGeom>
+        </p:spPr>
+        <p:style>
+          <a:lnRef idx="2">
+            <a:schemeClr val="accent4"/>
+          </a:lnRef>
+          <a:fillRef idx="1">
+            <a:schemeClr val="lt1"/>
+          </a:fillRef>
+          <a:effectRef idx="0">
+            <a:schemeClr val="accent4"/>
+          </a:effectRef>
+          <a:fontRef idx="minor">
+            <a:schemeClr val="dk1"/>
+          </a:fontRef>
+        </p:style>
+        <p:txBody>
+          <a:bodyPr rtlCol="0" anchor="t"/>
+          <a:lstStyle/>
+          <a:p>
+            <a:r>
+              <a:rPr lang="en-US" sz="1400" dirty="0" smtClean="0"/>
+              <a:t>Composite 2</a:t>
+            </a:r>
+            <a:endParaRPr lang="en-US" sz="1400" dirty="0"/>
+          </a:p>
+        </p:txBody>
+      </p:sp>
+      <p:sp>
+        <p:nvSpPr>
+          <p:cNvPr id="44" name="Rectangle 43"/>
+          <p:cNvSpPr/>
+          <p:nvPr/>
+        </p:nvSpPr>
+        <p:spPr>
+          <a:xfrm>
+            <a:off x="2340217" y="3917716"/>
+            <a:ext cx="4703884" cy="2431082"/>
+          </a:xfrm>
+          <a:prstGeom prst="rect">
+            <a:avLst/>
+          </a:prstGeom>
+        </p:spPr>
+        <p:style>
+          <a:lnRef idx="2">
+            <a:schemeClr val="accent5"/>
+          </a:lnRef>
+          <a:fillRef idx="1">
+            <a:schemeClr val="lt1"/>
+          </a:fillRef>
+          <a:effectRef idx="0">
+            <a:schemeClr val="accent5"/>
+          </a:effectRef>
+          <a:fontRef idx="minor">
+            <a:schemeClr val="dk1"/>
+          </a:fontRef>
+        </p:style>
+        <p:txBody>
+          <a:bodyPr rtlCol="0" anchor="t"/>
+          <a:lstStyle/>
+          <a:p>
+            <a:r>
+              <a:rPr lang="en-US" sz="1400" dirty="0" smtClean="0"/>
+              <a:t>Composite 3</a:t>
+            </a:r>
+            <a:endParaRPr lang="en-US" sz="1400" dirty="0"/>
+          </a:p>
+        </p:txBody>
+      </p:sp>
+      <p:sp>
+        <p:nvSpPr>
+          <p:cNvPr id="20" name="Rectangle 19"/>
+          <p:cNvSpPr/>
+          <p:nvPr/>
+        </p:nvSpPr>
+        <p:spPr>
+          <a:xfrm>
+            <a:off x="2347546" y="685800"/>
+            <a:ext cx="4703884" cy="2231788"/>
+          </a:xfrm>
+          <a:prstGeom prst="rect">
+            <a:avLst/>
+          </a:prstGeom>
+        </p:spPr>
+        <p:style>
+          <a:lnRef idx="2">
+            <a:schemeClr val="accent6"/>
+          </a:lnRef>
+          <a:fillRef idx="1">
+            <a:schemeClr val="lt1"/>
+          </a:fillRef>
+          <a:effectRef idx="0">
+            <a:schemeClr val="accent6"/>
+          </a:effectRef>
+          <a:fontRef idx="minor">
+            <a:schemeClr val="dk1"/>
+          </a:fontRef>
+        </p:style>
+        <p:txBody>
+          <a:bodyPr rtlCol="0" anchor="t"/>
+          <a:lstStyle/>
+          <a:p>
+            <a:r>
+              <a:rPr lang="en-US" sz="1400" dirty="0" smtClean="0"/>
+              <a:t>Composite 1</a:t>
+            </a:r>
+            <a:endParaRPr lang="en-US" sz="1400" dirty="0"/>
+          </a:p>
+        </p:txBody>
+      </p:sp>
+      <p:sp>
+        <p:nvSpPr>
           <p:cNvPr id="4" name="Oval 3"/>
           <p:cNvSpPr/>
           <p:nvPr/>
         </p:nvSpPr>
         <p:spPr>
           <a:xfrm>
-            <a:off x="7359161" y="1837593"/>
+            <a:off x="8212014" y="1635369"/>
             <a:ext cx="1169377" cy="457200"/>
           </a:xfrm>
           <a:prstGeom prst="ellipse">
@@ -3618,15 +3746,13 @@
           </a:prstGeom>
         </p:spPr>
         <p:style>
-          <a:lnRef idx="2">
-            <a:schemeClr val="accent6">
-              <a:shade val="50000"/>
-            </a:schemeClr>
+          <a:lnRef idx="0">
+            <a:schemeClr val="accent6"/>
           </a:lnRef>
-          <a:fillRef idx="1">
+          <a:fillRef idx="3">
             <a:schemeClr val="accent6"/>
           </a:fillRef>
-          <a:effectRef idx="0">
+          <a:effectRef idx="3">
             <a:schemeClr val="accent6"/>
           </a:effectRef>
           <a:fontRef idx="minor">
@@ -3654,7 +3780,7 @@
         </p:nvSpPr>
         <p:spPr>
           <a:xfrm>
-            <a:off x="7359160" y="2455986"/>
+            <a:off x="8212013" y="2253762"/>
             <a:ext cx="1169377" cy="457200"/>
           </a:xfrm>
           <a:prstGeom prst="ellipse">
@@ -3662,15 +3788,13 @@
           </a:prstGeom>
         </p:spPr>
         <p:style>
-          <a:lnRef idx="2">
-            <a:schemeClr val="accent6">
-              <a:shade val="50000"/>
-            </a:schemeClr>
+          <a:lnRef idx="0">
+            <a:schemeClr val="accent6"/>
           </a:lnRef>
-          <a:fillRef idx="1">
+          <a:fillRef idx="3">
             <a:schemeClr val="accent6"/>
           </a:fillRef>
-          <a:effectRef idx="0">
+          <a:effectRef idx="3">
             <a:schemeClr val="accent6"/>
           </a:effectRef>
           <a:fontRef idx="minor">
@@ -3698,7 +3822,7 @@
         </p:nvSpPr>
         <p:spPr>
           <a:xfrm>
-            <a:off x="7359159" y="3042141"/>
+            <a:off x="8212012" y="2839917"/>
             <a:ext cx="1169377" cy="457200"/>
           </a:xfrm>
           <a:prstGeom prst="ellipse">
@@ -3706,15 +3830,13 @@
           </a:prstGeom>
         </p:spPr>
         <p:style>
-          <a:lnRef idx="2">
-            <a:schemeClr val="accent6">
-              <a:shade val="50000"/>
-            </a:schemeClr>
+          <a:lnRef idx="0">
+            <a:schemeClr val="accent6"/>
           </a:lnRef>
-          <a:fillRef idx="1">
+          <a:fillRef idx="3">
             <a:schemeClr val="accent6"/>
           </a:fillRef>
-          <a:effectRef idx="0">
+          <a:effectRef idx="3">
             <a:schemeClr val="accent6"/>
           </a:effectRef>
           <a:fontRef idx="minor">
@@ -3742,7 +3864,7 @@
         </p:nvSpPr>
         <p:spPr>
           <a:xfrm>
-            <a:off x="7367949" y="3889132"/>
+            <a:off x="8220802" y="3686908"/>
             <a:ext cx="1169377" cy="457200"/>
           </a:xfrm>
           <a:prstGeom prst="ellipse">
@@ -3750,15 +3872,13 @@
           </a:prstGeom>
         </p:spPr>
         <p:style>
-          <a:lnRef idx="2">
-            <a:schemeClr val="accent1">
-              <a:shade val="50000"/>
-            </a:schemeClr>
+          <a:lnRef idx="0">
+            <a:schemeClr val="accent1"/>
           </a:lnRef>
-          <a:fillRef idx="1">
+          <a:fillRef idx="3">
             <a:schemeClr val="accent1"/>
           </a:fillRef>
-          <a:effectRef idx="0">
+          <a:effectRef idx="3">
             <a:schemeClr val="accent1"/>
           </a:effectRef>
           <a:fontRef idx="minor">
@@ -3786,7 +3906,7 @@
         </p:nvSpPr>
         <p:spPr>
           <a:xfrm>
-            <a:off x="7367949" y="4533904"/>
+            <a:off x="8220802" y="4331680"/>
             <a:ext cx="1169377" cy="457200"/>
           </a:xfrm>
           <a:prstGeom prst="ellipse">
@@ -3794,15 +3914,13 @@
           </a:prstGeom>
         </p:spPr>
         <p:style>
-          <a:lnRef idx="2">
-            <a:schemeClr val="accent1">
-              <a:shade val="50000"/>
-            </a:schemeClr>
+          <a:lnRef idx="0">
+            <a:schemeClr val="accent1"/>
           </a:lnRef>
-          <a:fillRef idx="1">
+          <a:fillRef idx="3">
             <a:schemeClr val="accent1"/>
           </a:fillRef>
-          <a:effectRef idx="0">
+          <a:effectRef idx="3">
             <a:schemeClr val="accent1"/>
           </a:effectRef>
           <a:fontRef idx="minor">
@@ -3830,7 +3948,7 @@
         </p:nvSpPr>
         <p:spPr>
           <a:xfrm>
-            <a:off x="4501662" y="2133601"/>
+            <a:off x="5354515" y="1931377"/>
             <a:ext cx="1186961" cy="668215"/>
           </a:xfrm>
           <a:prstGeom prst="rect">
@@ -3838,15 +3956,13 @@
           </a:prstGeom>
         </p:spPr>
         <p:style>
-          <a:lnRef idx="2">
-            <a:schemeClr val="accent6">
-              <a:shade val="50000"/>
-            </a:schemeClr>
+          <a:lnRef idx="0">
+            <a:schemeClr val="accent6"/>
           </a:lnRef>
-          <a:fillRef idx="1">
+          <a:fillRef idx="3">
             <a:schemeClr val="accent6"/>
           </a:fillRef>
-          <a:effectRef idx="0">
+          <a:effectRef idx="3">
             <a:schemeClr val="accent6"/>
           </a:effectRef>
           <a:fontRef idx="minor">
@@ -3860,7 +3976,11 @@
             <a:pPr algn="ctr"/>
             <a:r>
               <a:rPr lang="en-US" dirty="0" smtClean="0"/>
-              <a:t> Vehicle 1</a:t>
+              <a:t> Vehicle </a:t>
+            </a:r>
+            <a:r>
+              <a:rPr lang="en-US" dirty="0" smtClean="0"/>
+              <a:t>2</a:t>
             </a:r>
             <a:endParaRPr lang="en-US" dirty="0"/>
           </a:p>
@@ -3874,27 +3994,22 @@
         </p:nvSpPr>
         <p:spPr>
           <a:xfrm>
-            <a:off x="4501659" y="3270741"/>
+            <a:off x="5354512" y="3068517"/>
             <a:ext cx="1186961" cy="668215"/>
           </a:xfrm>
           <a:prstGeom prst="rect">
             <a:avLst/>
           </a:prstGeom>
-          <a:solidFill>
-            <a:srgbClr val="7030A0"/>
-          </a:solidFill>
         </p:spPr>
         <p:style>
-          <a:lnRef idx="2">
-            <a:schemeClr val="accent2">
-              <a:shade val="50000"/>
-            </a:schemeClr>
+          <a:lnRef idx="0">
+            <a:schemeClr val="accent4"/>
           </a:lnRef>
-          <a:fillRef idx="1">
-            <a:schemeClr val="accent2"/>
+          <a:fillRef idx="3">
+            <a:schemeClr val="accent4"/>
           </a:fillRef>
-          <a:effectRef idx="0">
-            <a:schemeClr val="accent2"/>
+          <a:effectRef idx="3">
+            <a:schemeClr val="accent4"/>
           </a:effectRef>
           <a:fontRef idx="minor">
             <a:schemeClr val="lt1"/>
@@ -3907,7 +4022,11 @@
             <a:pPr algn="ctr"/>
             <a:r>
               <a:rPr lang="en-US" dirty="0" smtClean="0"/>
-              <a:t>Vehicle 2</a:t>
+              <a:t>Vehicle </a:t>
+            </a:r>
+            <a:r>
+              <a:rPr lang="en-US" dirty="0" smtClean="0"/>
+              <a:t>3</a:t>
             </a:r>
             <a:endParaRPr lang="en-US" dirty="0"/>
           </a:p>
@@ -3921,7 +4040,7 @@
         </p:nvSpPr>
         <p:spPr>
           <a:xfrm>
-            <a:off x="4501660" y="4407881"/>
+            <a:off x="5354513" y="4205657"/>
             <a:ext cx="1186961" cy="668215"/>
           </a:xfrm>
           <a:prstGeom prst="rect">
@@ -3929,15 +4048,13 @@
           </a:prstGeom>
         </p:spPr>
         <p:style>
-          <a:lnRef idx="2">
-            <a:schemeClr val="accent1">
-              <a:shade val="50000"/>
-            </a:schemeClr>
+          <a:lnRef idx="0">
+            <a:schemeClr val="accent1"/>
           </a:lnRef>
-          <a:fillRef idx="1">
+          <a:fillRef idx="3">
             <a:schemeClr val="accent1"/>
           </a:fillRef>
-          <a:effectRef idx="0">
+          <a:effectRef idx="3">
             <a:schemeClr val="accent1"/>
           </a:effectRef>
           <a:fontRef idx="minor">
@@ -3951,7 +4068,11 @@
             <a:pPr algn="ctr"/>
             <a:r>
               <a:rPr lang="en-US" dirty="0" smtClean="0"/>
-              <a:t>Vehicle 3</a:t>
+              <a:t>Vehicle </a:t>
+            </a:r>
+            <a:r>
+              <a:rPr lang="en-US" dirty="0" smtClean="0"/>
+              <a:t>4</a:t>
             </a:r>
             <a:endParaRPr lang="en-US" dirty="0"/>
           </a:p>
@@ -3965,8 +4086,8 @@
         </p:nvCxnSpPr>
         <p:spPr>
           <a:xfrm flipV="1">
-            <a:off x="5855675" y="2133601"/>
-            <a:ext cx="1406771" cy="161193"/>
+            <a:off x="6708528" y="1860310"/>
+            <a:ext cx="1406771" cy="232261"/>
           </a:xfrm>
           <a:prstGeom prst="straightConnector1">
             <a:avLst/>
@@ -4001,7 +4122,7 @@
         </p:nvCxnSpPr>
         <p:spPr>
           <a:xfrm>
-            <a:off x="5855675" y="2467708"/>
+            <a:off x="6708528" y="2265484"/>
             <a:ext cx="1406771" cy="216878"/>
           </a:xfrm>
           <a:prstGeom prst="straightConnector1">
@@ -4036,9 +4157,9 @@
           <p:nvPr/>
         </p:nvCxnSpPr>
         <p:spPr>
-          <a:xfrm>
-            <a:off x="5824899" y="4762504"/>
-            <a:ext cx="1367209" cy="8794"/>
+          <a:xfrm flipV="1">
+            <a:off x="6677752" y="4558811"/>
+            <a:ext cx="1367209" cy="1469"/>
           </a:xfrm>
           <a:prstGeom prst="straightConnector1">
             <a:avLst/>
@@ -4073,7 +4194,7 @@
         </p:nvCxnSpPr>
         <p:spPr>
           <a:xfrm>
-            <a:off x="5855675" y="2684586"/>
+            <a:off x="6708528" y="2482362"/>
             <a:ext cx="1406771" cy="558312"/>
           </a:xfrm>
           <a:prstGeom prst="straightConnector1">
@@ -4109,7 +4230,7 @@
         </p:nvCxnSpPr>
         <p:spPr>
           <a:xfrm flipV="1">
-            <a:off x="5824899" y="4202723"/>
+            <a:off x="6677752" y="4000499"/>
             <a:ext cx="1367209" cy="430823"/>
           </a:xfrm>
           <a:prstGeom prst="straightConnector1">
@@ -4145,7 +4266,7 @@
         </p:nvCxnSpPr>
         <p:spPr>
           <a:xfrm flipV="1">
-            <a:off x="5855675" y="3371857"/>
+            <a:off x="6708528" y="3169633"/>
             <a:ext cx="1406771" cy="194894"/>
           </a:xfrm>
           <a:prstGeom prst="straightConnector1">
@@ -4181,7 +4302,7 @@
         </p:nvCxnSpPr>
         <p:spPr>
           <a:xfrm>
-            <a:off x="5864461" y="3695709"/>
+            <a:off x="6717314" y="3493485"/>
             <a:ext cx="1397985" cy="243247"/>
           </a:xfrm>
           <a:prstGeom prst="straightConnector1">
@@ -4217,27 +4338,32 @@
         </p:nvSpPr>
         <p:spPr>
           <a:xfrm>
-            <a:off x="2007577" y="1934307"/>
+            <a:off x="2860430" y="1732083"/>
             <a:ext cx="1169377" cy="457200"/>
           </a:xfrm>
           <a:prstGeom prst="ellipse">
             <a:avLst/>
           </a:prstGeom>
+          <a:effectLst>
+            <a:outerShdw blurRad="50800" dist="38100" dir="2700000" algn="tl" rotWithShape="0">
+              <a:prstClr val="black">
+                <a:alpha val="40000"/>
+              </a:prstClr>
+            </a:outerShdw>
+          </a:effectLst>
         </p:spPr>
         <p:style>
-          <a:lnRef idx="2">
-            <a:schemeClr val="accent3">
-              <a:shade val="50000"/>
-            </a:schemeClr>
+          <a:lnRef idx="1">
+            <a:schemeClr val="accent6"/>
           </a:lnRef>
-          <a:fillRef idx="1">
-            <a:schemeClr val="accent3"/>
+          <a:fillRef idx="2">
+            <a:schemeClr val="accent6"/>
           </a:fillRef>
-          <a:effectRef idx="0">
-            <a:schemeClr val="accent3"/>
+          <a:effectRef idx="1">
+            <a:schemeClr val="accent6"/>
           </a:effectRef>
           <a:fontRef idx="minor">
-            <a:schemeClr val="lt1"/>
+            <a:schemeClr val="dk1"/>
           </a:fontRef>
         </p:style>
         <p:txBody>
@@ -4247,7 +4373,11 @@
             <a:pPr algn="ctr"/>
             <a:r>
               <a:rPr lang="en-US" sz="1100" dirty="0" smtClean="0"/>
-              <a:t>Portfolio 1</a:t>
+              <a:t>Portfolio </a:t>
+            </a:r>
+            <a:r>
+              <a:rPr lang="en-US" sz="1100" dirty="0" smtClean="0"/>
+              <a:t>2</a:t>
             </a:r>
             <a:endParaRPr lang="en-US" sz="1100" dirty="0"/>
           </a:p>
@@ -4261,27 +4391,32 @@
         </p:nvSpPr>
         <p:spPr>
           <a:xfrm>
-            <a:off x="2007576" y="2552700"/>
+            <a:off x="2860429" y="2350476"/>
             <a:ext cx="1169377" cy="457200"/>
           </a:xfrm>
           <a:prstGeom prst="ellipse">
             <a:avLst/>
           </a:prstGeom>
+          <a:effectLst>
+            <a:outerShdw blurRad="50800" dist="38100" dir="2700000" algn="tl" rotWithShape="0">
+              <a:prstClr val="black">
+                <a:alpha val="40000"/>
+              </a:prstClr>
+            </a:outerShdw>
+          </a:effectLst>
         </p:spPr>
         <p:style>
-          <a:lnRef idx="2">
-            <a:schemeClr val="accent3">
-              <a:shade val="50000"/>
-            </a:schemeClr>
+          <a:lnRef idx="1">
+            <a:schemeClr val="accent6"/>
           </a:lnRef>
-          <a:fillRef idx="1">
-            <a:schemeClr val="accent3"/>
+          <a:fillRef idx="2">
+            <a:schemeClr val="accent6"/>
           </a:fillRef>
-          <a:effectRef idx="0">
-            <a:schemeClr val="accent3"/>
+          <a:effectRef idx="1">
+            <a:schemeClr val="accent6"/>
           </a:effectRef>
           <a:fontRef idx="minor">
-            <a:schemeClr val="lt1"/>
+            <a:schemeClr val="dk1"/>
           </a:fontRef>
         </p:style>
         <p:txBody>
@@ -4291,7 +4426,11 @@
             <a:pPr algn="ctr"/>
             <a:r>
               <a:rPr lang="en-US" sz="1100" dirty="0" smtClean="0"/>
-              <a:t>Portfolio 2</a:t>
+              <a:t>Portfolio </a:t>
+            </a:r>
+            <a:r>
+              <a:rPr lang="en-US" sz="1100" dirty="0" smtClean="0"/>
+              <a:t>3</a:t>
             </a:r>
             <a:endParaRPr lang="en-US" sz="1100" dirty="0"/>
           </a:p>
@@ -4305,27 +4444,32 @@
         </p:nvSpPr>
         <p:spPr>
           <a:xfrm>
-            <a:off x="2007576" y="3338151"/>
+            <a:off x="2860428" y="3274386"/>
             <a:ext cx="1169377" cy="457200"/>
           </a:xfrm>
           <a:prstGeom prst="ellipse">
             <a:avLst/>
           </a:prstGeom>
+          <a:effectLst>
+            <a:outerShdw blurRad="50800" dist="38100" dir="2700000" algn="tl" rotWithShape="0">
+              <a:prstClr val="black">
+                <a:alpha val="40000"/>
+              </a:prstClr>
+            </a:outerShdw>
+          </a:effectLst>
         </p:spPr>
         <p:style>
-          <a:lnRef idx="2">
-            <a:schemeClr val="accent3">
-              <a:shade val="50000"/>
-            </a:schemeClr>
+          <a:lnRef idx="1">
+            <a:schemeClr val="accent4"/>
           </a:lnRef>
-          <a:fillRef idx="1">
-            <a:schemeClr val="accent3"/>
+          <a:fillRef idx="2">
+            <a:schemeClr val="accent4"/>
           </a:fillRef>
-          <a:effectRef idx="0">
-            <a:schemeClr val="accent3"/>
+          <a:effectRef idx="1">
+            <a:schemeClr val="accent4"/>
           </a:effectRef>
           <a:fontRef idx="minor">
-            <a:schemeClr val="lt1"/>
+            <a:schemeClr val="dk1"/>
           </a:fontRef>
         </p:style>
         <p:txBody>
@@ -4335,7 +4479,11 @@
             <a:pPr algn="ctr"/>
             <a:r>
               <a:rPr lang="en-US" sz="1100" dirty="0" smtClean="0"/>
-              <a:t>Portfolio 3</a:t>
+              <a:t>Portfolio </a:t>
+            </a:r>
+            <a:r>
+              <a:rPr lang="en-US" sz="1100" dirty="0" smtClean="0"/>
+              <a:t>4</a:t>
             </a:r>
             <a:endParaRPr lang="en-US" sz="1100" dirty="0"/>
           </a:p>
@@ -4349,27 +4497,32 @@
         </p:nvSpPr>
         <p:spPr>
           <a:xfrm>
-            <a:off x="2007575" y="4418134"/>
+            <a:off x="2860428" y="4295038"/>
             <a:ext cx="1169377" cy="457200"/>
           </a:xfrm>
           <a:prstGeom prst="ellipse">
             <a:avLst/>
           </a:prstGeom>
+          <a:effectLst>
+            <a:outerShdw blurRad="50800" dist="38100" dir="2700000" algn="tl" rotWithShape="0">
+              <a:prstClr val="black">
+                <a:alpha val="40000"/>
+              </a:prstClr>
+            </a:outerShdw>
+          </a:effectLst>
         </p:spPr>
         <p:style>
-          <a:lnRef idx="2">
-            <a:schemeClr val="accent3">
-              <a:shade val="50000"/>
-            </a:schemeClr>
+          <a:lnRef idx="1">
+            <a:schemeClr val="accent1"/>
           </a:lnRef>
-          <a:fillRef idx="1">
-            <a:schemeClr val="accent3"/>
+          <a:fillRef idx="2">
+            <a:schemeClr val="accent1"/>
           </a:fillRef>
-          <a:effectRef idx="0">
-            <a:schemeClr val="accent3"/>
+          <a:effectRef idx="1">
+            <a:schemeClr val="accent1"/>
           </a:effectRef>
           <a:fontRef idx="minor">
-            <a:schemeClr val="lt1"/>
+            <a:schemeClr val="dk1"/>
           </a:fontRef>
         </p:style>
         <p:txBody>
@@ -4379,7 +4532,11 @@
             <a:pPr algn="ctr"/>
             <a:r>
               <a:rPr lang="en-US" sz="1100" dirty="0" smtClean="0"/>
-              <a:t>Portfolio 4</a:t>
+              <a:t>Portfolio </a:t>
+            </a:r>
+            <a:r>
+              <a:rPr lang="en-US" sz="1100" dirty="0" smtClean="0"/>
+              <a:t>5</a:t>
             </a:r>
             <a:endParaRPr lang="en-US" sz="1100" dirty="0"/>
           </a:p>
@@ -4393,7 +4550,7 @@
         </p:nvCxnSpPr>
         <p:spPr>
           <a:xfrm>
-            <a:off x="3273669" y="2162908"/>
+            <a:off x="4126522" y="1960684"/>
             <a:ext cx="1131278" cy="224204"/>
           </a:xfrm>
           <a:prstGeom prst="straightConnector1">
@@ -4429,7 +4586,7 @@
         </p:nvCxnSpPr>
         <p:spPr>
           <a:xfrm flipV="1">
-            <a:off x="3273667" y="2576147"/>
+            <a:off x="4126520" y="2373923"/>
             <a:ext cx="1131280" cy="189036"/>
           </a:xfrm>
           <a:prstGeom prst="straightConnector1">
@@ -4464,9 +4621,9 @@
           <p:nvPr/>
         </p:nvCxnSpPr>
         <p:spPr>
-          <a:xfrm>
-            <a:off x="3273666" y="3566751"/>
-            <a:ext cx="1131280" cy="0"/>
+          <a:xfrm flipV="1">
+            <a:off x="4126519" y="3364527"/>
+            <a:ext cx="1131280" cy="138459"/>
           </a:xfrm>
           <a:prstGeom prst="straightConnector1">
             <a:avLst/>
@@ -4501,8 +4658,559 @@
         </p:nvCxnSpPr>
         <p:spPr>
           <a:xfrm>
-            <a:off x="3273666" y="4633546"/>
+            <a:off x="4126519" y="4510450"/>
             <a:ext cx="1131280" cy="0"/>
+          </a:xfrm>
+          <a:prstGeom prst="straightConnector1">
+            <a:avLst/>
+          </a:prstGeom>
+          <a:ln>
+            <a:solidFill>
+              <a:schemeClr val="tx1"/>
+            </a:solidFill>
+            <a:tailEnd type="triangle"/>
+          </a:ln>
+        </p:spPr>
+        <p:style>
+          <a:lnRef idx="1">
+            <a:schemeClr val="accent1"/>
+          </a:lnRef>
+          <a:fillRef idx="0">
+            <a:schemeClr val="accent1"/>
+          </a:fillRef>
+          <a:effectRef idx="0">
+            <a:schemeClr val="accent1"/>
+          </a:effectRef>
+          <a:fontRef idx="minor">
+            <a:schemeClr val="tx1"/>
+          </a:fontRef>
+        </p:style>
+      </p:cxnSp>
+      <p:sp>
+        <p:nvSpPr>
+          <p:cNvPr id="28" name="Oval 27"/>
+          <p:cNvSpPr/>
+          <p:nvPr/>
+        </p:nvSpPr>
+        <p:spPr>
+          <a:xfrm>
+            <a:off x="8212011" y="5442444"/>
+            <a:ext cx="1169377" cy="457200"/>
+          </a:xfrm>
+          <a:prstGeom prst="ellipse">
+            <a:avLst/>
+          </a:prstGeom>
+        </p:spPr>
+        <p:style>
+          <a:lnRef idx="0">
+            <a:schemeClr val="accent1"/>
+          </a:lnRef>
+          <a:fillRef idx="3">
+            <a:schemeClr val="accent1"/>
+          </a:fillRef>
+          <a:effectRef idx="3">
+            <a:schemeClr val="accent1"/>
+          </a:effectRef>
+          <a:fontRef idx="minor">
+            <a:schemeClr val="lt1"/>
+          </a:fontRef>
+        </p:style>
+        <p:txBody>
+          <a:bodyPr rtlCol="0" anchor="ctr"/>
+          <a:lstStyle/>
+          <a:p>
+            <a:pPr algn="ctr"/>
+            <a:r>
+              <a:rPr lang="en-US" sz="1400" dirty="0" smtClean="0"/>
+              <a:t>Bond </a:t>
+            </a:r>
+            <a:r>
+              <a:rPr lang="en-US" sz="1400" dirty="0" smtClean="0"/>
+              <a:t>3</a:t>
+            </a:r>
+            <a:endParaRPr lang="en-US" sz="1400" dirty="0"/>
+          </a:p>
+        </p:txBody>
+      </p:sp>
+      <p:sp>
+        <p:nvSpPr>
+          <p:cNvPr id="29" name="Rectangle 28"/>
+          <p:cNvSpPr/>
+          <p:nvPr/>
+        </p:nvSpPr>
+        <p:spPr>
+          <a:xfrm>
+            <a:off x="5354512" y="5336937"/>
+            <a:ext cx="1186961" cy="668215"/>
+          </a:xfrm>
+          <a:prstGeom prst="rect">
+            <a:avLst/>
+          </a:prstGeom>
+        </p:spPr>
+        <p:style>
+          <a:lnRef idx="0">
+            <a:schemeClr val="accent1"/>
+          </a:lnRef>
+          <a:fillRef idx="3">
+            <a:schemeClr val="accent1"/>
+          </a:fillRef>
+          <a:effectRef idx="3">
+            <a:schemeClr val="accent1"/>
+          </a:effectRef>
+          <a:fontRef idx="minor">
+            <a:schemeClr val="lt1"/>
+          </a:fontRef>
+        </p:style>
+        <p:txBody>
+          <a:bodyPr rtlCol="0" anchor="ctr"/>
+          <a:lstStyle/>
+          <a:p>
+            <a:pPr algn="ctr"/>
+            <a:r>
+              <a:rPr lang="en-US" dirty="0" smtClean="0"/>
+              <a:t>Vehicle </a:t>
+            </a:r>
+            <a:r>
+              <a:rPr lang="en-US" dirty="0" smtClean="0"/>
+              <a:t>5</a:t>
+            </a:r>
+            <a:endParaRPr lang="en-US" dirty="0"/>
+          </a:p>
+        </p:txBody>
+      </p:sp>
+      <p:cxnSp>
+        <p:nvCxnSpPr>
+          <p:cNvPr id="32" name="Straight Arrow Connector 31"/>
+          <p:cNvCxnSpPr/>
+          <p:nvPr/>
+        </p:nvCxnSpPr>
+        <p:spPr>
+          <a:xfrm flipV="1">
+            <a:off x="6708528" y="5643192"/>
+            <a:ext cx="1367209" cy="1469"/>
+          </a:xfrm>
+          <a:prstGeom prst="straightConnector1">
+            <a:avLst/>
+          </a:prstGeom>
+          <a:ln>
+            <a:solidFill>
+              <a:schemeClr val="tx1"/>
+            </a:solidFill>
+            <a:tailEnd type="triangle"/>
+          </a:ln>
+        </p:spPr>
+        <p:style>
+          <a:lnRef idx="1">
+            <a:schemeClr val="accent1"/>
+          </a:lnRef>
+          <a:fillRef idx="0">
+            <a:schemeClr val="accent1"/>
+          </a:fillRef>
+          <a:effectRef idx="0">
+            <a:schemeClr val="accent1"/>
+          </a:effectRef>
+          <a:fontRef idx="minor">
+            <a:schemeClr val="tx1"/>
+          </a:fontRef>
+        </p:style>
+      </p:cxnSp>
+      <p:sp>
+        <p:nvSpPr>
+          <p:cNvPr id="34" name="Oval 33"/>
+          <p:cNvSpPr/>
+          <p:nvPr/>
+        </p:nvSpPr>
+        <p:spPr>
+          <a:xfrm>
+            <a:off x="2819393" y="5108337"/>
+            <a:ext cx="1169377" cy="457200"/>
+          </a:xfrm>
+          <a:prstGeom prst="ellipse">
+            <a:avLst/>
+          </a:prstGeom>
+          <a:effectLst>
+            <a:outerShdw blurRad="50800" dist="38100" dir="2700000" algn="tl" rotWithShape="0">
+              <a:prstClr val="black">
+                <a:alpha val="40000"/>
+              </a:prstClr>
+            </a:outerShdw>
+          </a:effectLst>
+        </p:spPr>
+        <p:style>
+          <a:lnRef idx="1">
+            <a:schemeClr val="accent1"/>
+          </a:lnRef>
+          <a:fillRef idx="2">
+            <a:schemeClr val="accent1"/>
+          </a:fillRef>
+          <a:effectRef idx="1">
+            <a:schemeClr val="accent1"/>
+          </a:effectRef>
+          <a:fontRef idx="minor">
+            <a:schemeClr val="dk1"/>
+          </a:fontRef>
+        </p:style>
+        <p:txBody>
+          <a:bodyPr rtlCol="0" anchor="ctr"/>
+          <a:lstStyle/>
+          <a:p>
+            <a:pPr algn="ctr"/>
+            <a:r>
+              <a:rPr lang="en-US" sz="1100" dirty="0" smtClean="0"/>
+              <a:t>Portfolio </a:t>
+            </a:r>
+            <a:r>
+              <a:rPr lang="en-US" sz="1100" dirty="0" smtClean="0"/>
+              <a:t>6</a:t>
+            </a:r>
+            <a:endParaRPr lang="en-US" sz="1100" dirty="0"/>
+          </a:p>
+        </p:txBody>
+      </p:sp>
+      <p:sp>
+        <p:nvSpPr>
+          <p:cNvPr id="35" name="Oval 34"/>
+          <p:cNvSpPr/>
+          <p:nvPr/>
+        </p:nvSpPr>
+        <p:spPr>
+          <a:xfrm>
+            <a:off x="2819392" y="5726730"/>
+            <a:ext cx="1169377" cy="457200"/>
+          </a:xfrm>
+          <a:prstGeom prst="ellipse">
+            <a:avLst/>
+          </a:prstGeom>
+          <a:effectLst>
+            <a:outerShdw blurRad="50800" dist="38100" dir="2700000" algn="tl" rotWithShape="0">
+              <a:prstClr val="black">
+                <a:alpha val="40000"/>
+              </a:prstClr>
+            </a:outerShdw>
+          </a:effectLst>
+        </p:spPr>
+        <p:style>
+          <a:lnRef idx="1">
+            <a:schemeClr val="accent1"/>
+          </a:lnRef>
+          <a:fillRef idx="2">
+            <a:schemeClr val="accent1"/>
+          </a:fillRef>
+          <a:effectRef idx="1">
+            <a:schemeClr val="accent1"/>
+          </a:effectRef>
+          <a:fontRef idx="minor">
+            <a:schemeClr val="dk1"/>
+          </a:fontRef>
+        </p:style>
+        <p:txBody>
+          <a:bodyPr rtlCol="0" anchor="ctr"/>
+          <a:lstStyle/>
+          <a:p>
+            <a:pPr algn="ctr"/>
+            <a:r>
+              <a:rPr lang="en-US" sz="1100" dirty="0" smtClean="0"/>
+              <a:t>Portfolio </a:t>
+            </a:r>
+            <a:r>
+              <a:rPr lang="en-US" sz="1100" dirty="0" smtClean="0"/>
+              <a:t>7</a:t>
+            </a:r>
+            <a:endParaRPr lang="en-US" sz="1100" dirty="0"/>
+          </a:p>
+        </p:txBody>
+      </p:sp>
+      <p:cxnSp>
+        <p:nvCxnSpPr>
+          <p:cNvPr id="36" name="Straight Arrow Connector 35"/>
+          <p:cNvCxnSpPr/>
+          <p:nvPr/>
+        </p:nvCxnSpPr>
+        <p:spPr>
+          <a:xfrm>
+            <a:off x="4085485" y="5336938"/>
+            <a:ext cx="1131278" cy="224204"/>
+          </a:xfrm>
+          <a:prstGeom prst="straightConnector1">
+            <a:avLst/>
+          </a:prstGeom>
+          <a:ln>
+            <a:solidFill>
+              <a:schemeClr val="tx1"/>
+            </a:solidFill>
+            <a:tailEnd type="triangle"/>
+          </a:ln>
+        </p:spPr>
+        <p:style>
+          <a:lnRef idx="1">
+            <a:schemeClr val="accent1"/>
+          </a:lnRef>
+          <a:fillRef idx="0">
+            <a:schemeClr val="accent1"/>
+          </a:fillRef>
+          <a:effectRef idx="0">
+            <a:schemeClr val="accent1"/>
+          </a:effectRef>
+          <a:fontRef idx="minor">
+            <a:schemeClr val="tx1"/>
+          </a:fontRef>
+        </p:style>
+      </p:cxnSp>
+      <p:cxnSp>
+        <p:nvCxnSpPr>
+          <p:cNvPr id="37" name="Straight Arrow Connector 36"/>
+          <p:cNvCxnSpPr/>
+          <p:nvPr/>
+        </p:nvCxnSpPr>
+        <p:spPr>
+          <a:xfrm flipV="1">
+            <a:off x="4085483" y="5750177"/>
+            <a:ext cx="1131280" cy="189036"/>
+          </a:xfrm>
+          <a:prstGeom prst="straightConnector1">
+            <a:avLst/>
+          </a:prstGeom>
+          <a:ln>
+            <a:solidFill>
+              <a:schemeClr val="tx1"/>
+            </a:solidFill>
+            <a:tailEnd type="triangle"/>
+          </a:ln>
+        </p:spPr>
+        <p:style>
+          <a:lnRef idx="1">
+            <a:schemeClr val="accent1"/>
+          </a:lnRef>
+          <a:fillRef idx="0">
+            <a:schemeClr val="accent1"/>
+          </a:fillRef>
+          <a:effectRef idx="0">
+            <a:schemeClr val="accent1"/>
+          </a:effectRef>
+          <a:fontRef idx="minor">
+            <a:schemeClr val="tx1"/>
+          </a:fontRef>
+        </p:style>
+      </p:cxnSp>
+      <p:sp>
+        <p:nvSpPr>
+          <p:cNvPr id="38" name="Oval 37"/>
+          <p:cNvSpPr/>
+          <p:nvPr/>
+        </p:nvSpPr>
+        <p:spPr>
+          <a:xfrm>
+            <a:off x="8229591" y="1016976"/>
+            <a:ext cx="1169377" cy="457200"/>
+          </a:xfrm>
+          <a:prstGeom prst="ellipse">
+            <a:avLst/>
+          </a:prstGeom>
+        </p:spPr>
+        <p:style>
+          <a:lnRef idx="0">
+            <a:schemeClr val="accent6"/>
+          </a:lnRef>
+          <a:fillRef idx="3">
+            <a:schemeClr val="accent6"/>
+          </a:fillRef>
+          <a:effectRef idx="3">
+            <a:schemeClr val="accent6"/>
+          </a:effectRef>
+          <a:fontRef idx="minor">
+            <a:schemeClr val="lt1"/>
+          </a:fontRef>
+        </p:style>
+        <p:txBody>
+          <a:bodyPr rtlCol="0" anchor="ctr"/>
+          <a:lstStyle/>
+          <a:p>
+            <a:pPr algn="ctr"/>
+            <a:r>
+              <a:rPr lang="en-US" dirty="0" smtClean="0"/>
+              <a:t>Pepsi</a:t>
+            </a:r>
+            <a:endParaRPr lang="en-US" dirty="0"/>
+          </a:p>
+        </p:txBody>
+      </p:sp>
+      <p:sp>
+        <p:nvSpPr>
+          <p:cNvPr id="39" name="Rectangle 38"/>
+          <p:cNvSpPr/>
+          <p:nvPr/>
+        </p:nvSpPr>
+        <p:spPr>
+          <a:xfrm>
+            <a:off x="5354512" y="967154"/>
+            <a:ext cx="1186961" cy="668215"/>
+          </a:xfrm>
+          <a:prstGeom prst="rect">
+            <a:avLst/>
+          </a:prstGeom>
+        </p:spPr>
+        <p:style>
+          <a:lnRef idx="0">
+            <a:schemeClr val="accent6"/>
+          </a:lnRef>
+          <a:fillRef idx="3">
+            <a:schemeClr val="accent6"/>
+          </a:fillRef>
+          <a:effectRef idx="3">
+            <a:schemeClr val="accent6"/>
+          </a:effectRef>
+          <a:fontRef idx="minor">
+            <a:schemeClr val="lt1"/>
+          </a:fontRef>
+        </p:style>
+        <p:txBody>
+          <a:bodyPr rtlCol="0" anchor="ctr"/>
+          <a:lstStyle/>
+          <a:p>
+            <a:pPr algn="ctr"/>
+            <a:r>
+              <a:rPr lang="en-US" dirty="0" smtClean="0"/>
+              <a:t> Vehicle 1</a:t>
+            </a:r>
+            <a:endParaRPr lang="en-US" dirty="0"/>
+          </a:p>
+        </p:txBody>
+      </p:sp>
+      <p:cxnSp>
+        <p:nvCxnSpPr>
+          <p:cNvPr id="40" name="Straight Arrow Connector 39"/>
+          <p:cNvCxnSpPr/>
+          <p:nvPr/>
+        </p:nvCxnSpPr>
+        <p:spPr>
+          <a:xfrm flipV="1">
+            <a:off x="6677751" y="1239721"/>
+            <a:ext cx="1367209" cy="1469"/>
+          </a:xfrm>
+          <a:prstGeom prst="straightConnector1">
+            <a:avLst/>
+          </a:prstGeom>
+          <a:ln>
+            <a:solidFill>
+              <a:schemeClr val="tx1"/>
+            </a:solidFill>
+            <a:tailEnd type="triangle"/>
+          </a:ln>
+        </p:spPr>
+        <p:style>
+          <a:lnRef idx="1">
+            <a:schemeClr val="accent1"/>
+          </a:lnRef>
+          <a:fillRef idx="0">
+            <a:schemeClr val="accent1"/>
+          </a:fillRef>
+          <a:effectRef idx="0">
+            <a:schemeClr val="accent1"/>
+          </a:effectRef>
+          <a:fontRef idx="minor">
+            <a:schemeClr val="tx1"/>
+          </a:fontRef>
+        </p:style>
+      </p:cxnSp>
+      <p:sp>
+        <p:nvSpPr>
+          <p:cNvPr id="41" name="Oval 40"/>
+          <p:cNvSpPr/>
+          <p:nvPr/>
+        </p:nvSpPr>
+        <p:spPr>
+          <a:xfrm>
+            <a:off x="2819392" y="1030172"/>
+            <a:ext cx="1169377" cy="457200"/>
+          </a:xfrm>
+          <a:prstGeom prst="ellipse">
+            <a:avLst/>
+          </a:prstGeom>
+          <a:effectLst>
+            <a:outerShdw blurRad="50800" dist="38100" dir="2700000" algn="tl" rotWithShape="0">
+              <a:prstClr val="black">
+                <a:alpha val="40000"/>
+              </a:prstClr>
+            </a:outerShdw>
+          </a:effectLst>
+        </p:spPr>
+        <p:style>
+          <a:lnRef idx="1">
+            <a:schemeClr val="accent6"/>
+          </a:lnRef>
+          <a:fillRef idx="2">
+            <a:schemeClr val="accent6"/>
+          </a:fillRef>
+          <a:effectRef idx="1">
+            <a:schemeClr val="accent6"/>
+          </a:effectRef>
+          <a:fontRef idx="minor">
+            <a:schemeClr val="dk1"/>
+          </a:fontRef>
+        </p:style>
+        <p:txBody>
+          <a:bodyPr rtlCol="0" anchor="ctr"/>
+          <a:lstStyle/>
+          <a:p>
+            <a:pPr algn="ctr"/>
+            <a:r>
+              <a:rPr lang="en-US" sz="1100" dirty="0" smtClean="0"/>
+              <a:t>Portfolio </a:t>
+            </a:r>
+            <a:r>
+              <a:rPr lang="en-US" sz="1100" dirty="0" smtClean="0"/>
+              <a:t>1</a:t>
+            </a:r>
+            <a:endParaRPr lang="en-US" sz="1100" dirty="0"/>
+          </a:p>
+        </p:txBody>
+      </p:sp>
+      <p:cxnSp>
+        <p:nvCxnSpPr>
+          <p:cNvPr id="42" name="Straight Arrow Connector 41"/>
+          <p:cNvCxnSpPr/>
+          <p:nvPr/>
+        </p:nvCxnSpPr>
+        <p:spPr>
+          <a:xfrm>
+            <a:off x="4085483" y="1245584"/>
+            <a:ext cx="1131280" cy="0"/>
+          </a:xfrm>
+          <a:prstGeom prst="straightConnector1">
+            <a:avLst/>
+          </a:prstGeom>
+          <a:ln>
+            <a:solidFill>
+              <a:schemeClr val="tx1"/>
+            </a:solidFill>
+            <a:tailEnd type="triangle"/>
+          </a:ln>
+        </p:spPr>
+        <p:style>
+          <a:lnRef idx="1">
+            <a:schemeClr val="accent1"/>
+          </a:lnRef>
+          <a:fillRef idx="0">
+            <a:schemeClr val="accent1"/>
+          </a:fillRef>
+          <a:effectRef idx="0">
+            <a:schemeClr val="accent1"/>
+          </a:effectRef>
+          <a:fontRef idx="minor">
+            <a:schemeClr val="tx1"/>
+          </a:fontRef>
+        </p:style>
+      </p:cxnSp>
+      <p:cxnSp>
+        <p:nvCxnSpPr>
+          <p:cNvPr id="43" name="Straight Arrow Connector 42"/>
+          <p:cNvCxnSpPr/>
+          <p:nvPr/>
+        </p:nvCxnSpPr>
+        <p:spPr>
+          <a:xfrm>
+            <a:off x="6677751" y="1368679"/>
+            <a:ext cx="1437548" cy="1502754"/>
           </a:xfrm>
           <a:prstGeom prst="straightConnector1">
             <a:avLst/>

</xml_diff>